<commit_message>
this made a bunch of blurry figures
</commit_message>
<xml_diff>
--- a/results/figures/model.pptx
+++ b/results/figures/model.pptx
@@ -104,6 +104,11 @@
       </a:defRPr>
     </a:lvl9pPr>
   </p:defaultTextStyle>
+  <p:extLst>
+    <p:ext uri="{EFAFB233-063F-42B5-8137-9DF3F51BA10A}">
+      <p15:sldGuideLst xmlns:p15="http://schemas.microsoft.com/office/powerpoint/2012/main"/>
+    </p:ext>
+  </p:extLst>
 </p:presentation>
 </file>
 
@@ -238,7 +243,7 @@
           <a:p>
             <a:fld id="{329862B0-1AD4-4AD5-9804-4753F3753061}" type="datetimeFigureOut">
               <a:rPr lang="en-US" smtClean="0"/>
-              <a:t>10/24/2023</a:t>
+              <a:t>2/16/2024</a:t>
             </a:fld>
             <a:endParaRPr lang="en-US"/>
           </a:p>
@@ -408,7 +413,7 @@
           <a:p>
             <a:fld id="{329862B0-1AD4-4AD5-9804-4753F3753061}" type="datetimeFigureOut">
               <a:rPr lang="en-US" smtClean="0"/>
-              <a:t>10/24/2023</a:t>
+              <a:t>2/16/2024</a:t>
             </a:fld>
             <a:endParaRPr lang="en-US"/>
           </a:p>
@@ -588,7 +593,7 @@
           <a:p>
             <a:fld id="{329862B0-1AD4-4AD5-9804-4753F3753061}" type="datetimeFigureOut">
               <a:rPr lang="en-US" smtClean="0"/>
-              <a:t>10/24/2023</a:t>
+              <a:t>2/16/2024</a:t>
             </a:fld>
             <a:endParaRPr lang="en-US"/>
           </a:p>
@@ -758,7 +763,7 @@
           <a:p>
             <a:fld id="{329862B0-1AD4-4AD5-9804-4753F3753061}" type="datetimeFigureOut">
               <a:rPr lang="en-US" smtClean="0"/>
-              <a:t>10/24/2023</a:t>
+              <a:t>2/16/2024</a:t>
             </a:fld>
             <a:endParaRPr lang="en-US"/>
           </a:p>
@@ -1004,7 +1009,7 @@
           <a:p>
             <a:fld id="{329862B0-1AD4-4AD5-9804-4753F3753061}" type="datetimeFigureOut">
               <a:rPr lang="en-US" smtClean="0"/>
-              <a:t>10/24/2023</a:t>
+              <a:t>2/16/2024</a:t>
             </a:fld>
             <a:endParaRPr lang="en-US"/>
           </a:p>
@@ -1236,7 +1241,7 @@
           <a:p>
             <a:fld id="{329862B0-1AD4-4AD5-9804-4753F3753061}" type="datetimeFigureOut">
               <a:rPr lang="en-US" smtClean="0"/>
-              <a:t>10/24/2023</a:t>
+              <a:t>2/16/2024</a:t>
             </a:fld>
             <a:endParaRPr lang="en-US"/>
           </a:p>
@@ -1603,7 +1608,7 @@
           <a:p>
             <a:fld id="{329862B0-1AD4-4AD5-9804-4753F3753061}" type="datetimeFigureOut">
               <a:rPr lang="en-US" smtClean="0"/>
-              <a:t>10/24/2023</a:t>
+              <a:t>2/16/2024</a:t>
             </a:fld>
             <a:endParaRPr lang="en-US"/>
           </a:p>
@@ -1721,7 +1726,7 @@
           <a:p>
             <a:fld id="{329862B0-1AD4-4AD5-9804-4753F3753061}" type="datetimeFigureOut">
               <a:rPr lang="en-US" smtClean="0"/>
-              <a:t>10/24/2023</a:t>
+              <a:t>2/16/2024</a:t>
             </a:fld>
             <a:endParaRPr lang="en-US"/>
           </a:p>
@@ -1816,7 +1821,7 @@
           <a:p>
             <a:fld id="{329862B0-1AD4-4AD5-9804-4753F3753061}" type="datetimeFigureOut">
               <a:rPr lang="en-US" smtClean="0"/>
-              <a:t>10/24/2023</a:t>
+              <a:t>2/16/2024</a:t>
             </a:fld>
             <a:endParaRPr lang="en-US"/>
           </a:p>
@@ -2093,7 +2098,7 @@
           <a:p>
             <a:fld id="{329862B0-1AD4-4AD5-9804-4753F3753061}" type="datetimeFigureOut">
               <a:rPr lang="en-US" smtClean="0"/>
-              <a:t>10/24/2023</a:t>
+              <a:t>2/16/2024</a:t>
             </a:fld>
             <a:endParaRPr lang="en-US"/>
           </a:p>
@@ -2350,7 +2355,7 @@
           <a:p>
             <a:fld id="{329862B0-1AD4-4AD5-9804-4753F3753061}" type="datetimeFigureOut">
               <a:rPr lang="en-US" smtClean="0"/>
-              <a:t>10/24/2023</a:t>
+              <a:t>2/16/2024</a:t>
             </a:fld>
             <a:endParaRPr lang="en-US"/>
           </a:p>
@@ -2563,7 +2568,7 @@
           <a:p>
             <a:fld id="{329862B0-1AD4-4AD5-9804-4753F3753061}" type="datetimeFigureOut">
               <a:rPr lang="en-US" smtClean="0"/>
-              <a:t>10/24/2023</a:t>
+              <a:t>2/16/2024</a:t>
             </a:fld>
             <a:endParaRPr lang="en-US"/>
           </a:p>
@@ -2970,10 +2975,10 @@
       </p:grpSpPr>
       <p:pic>
         <p:nvPicPr>
-          <p:cNvPr id="5" name="Picture 4" descr="A diagram of a normal value&#10;&#10;Description automatically generated">
+          <p:cNvPr id="3" name="Picture 2" descr="A diagram of a normal distribution&#10;&#10;Description automatically generated">
             <a:extLst>
               <a:ext uri="{FF2B5EF4-FFF2-40B4-BE49-F238E27FC236}">
-                <a16:creationId xmlns:a16="http://schemas.microsoft.com/office/drawing/2014/main" id="{3F3A3DA2-4299-F792-4787-247E207D52F6}"/>
+                <a16:creationId xmlns:a16="http://schemas.microsoft.com/office/drawing/2014/main" id="{930F84B8-B433-17E7-A3F4-B3EEAE50BBF5}"/>
               </a:ext>
             </a:extLst>
           </p:cNvPr>
@@ -2996,8 +3001,8 @@
         </p:blipFill>
         <p:spPr>
           <a:xfrm>
-            <a:off x="0" y="-812528"/>
-            <a:ext cx="12192000" cy="5549580"/>
+            <a:off x="0" y="92851"/>
+            <a:ext cx="12192000" cy="4614898"/>
           </a:xfrm>
           <a:prstGeom prst="rect">
             <a:avLst/>
@@ -3018,7 +3023,7 @@
         </p:nvCxnSpPr>
         <p:spPr>
           <a:xfrm>
-            <a:off x="5032767" y="1971007"/>
+            <a:off x="5032763" y="2400300"/>
             <a:ext cx="332509" cy="0"/>
           </a:xfrm>
           <a:prstGeom prst="line">
@@ -3028,6 +3033,8 @@
             <a:solidFill>
               <a:schemeClr val="tx1"/>
             </a:solidFill>
+            <a:headEnd type="triangle" w="sm" len="sm"/>
+            <a:tailEnd type="triangle" w="sm" len="sm"/>
           </a:ln>
         </p:spPr>
         <p:style>
@@ -3062,7 +3069,7 @@
         <p:spPr>
           <a:xfrm>
             <a:off x="5032763" y="1750521"/>
-            <a:ext cx="3082834" cy="0"/>
+            <a:ext cx="2448692" cy="0"/>
           </a:xfrm>
           <a:prstGeom prst="line">
             <a:avLst/>
@@ -3071,6 +3078,8 @@
             <a:solidFill>
               <a:schemeClr val="tx1"/>
             </a:solidFill>
+            <a:headEnd type="triangle"/>
+            <a:tailEnd type="triangle"/>
           </a:ln>
         </p:spPr>
         <p:style>
@@ -3104,7 +3113,7 @@
         </p:nvCxnSpPr>
         <p:spPr>
           <a:xfrm>
-            <a:off x="5032767" y="3156869"/>
+            <a:off x="5032767" y="3448557"/>
             <a:ext cx="2175281" cy="0"/>
           </a:xfrm>
           <a:prstGeom prst="line">
@@ -3114,6 +3123,8 @@
             <a:solidFill>
               <a:schemeClr val="tx1"/>
             </a:solidFill>
+            <a:headEnd type="triangle"/>
+            <a:tailEnd type="triangle"/>
           </a:ln>
         </p:spPr>
         <p:style>
@@ -3147,7 +3158,7 @@
             </p:nvSpPr>
             <p:spPr>
               <a:xfrm>
-                <a:off x="5388769" y="1775857"/>
+                <a:off x="5365272" y="2184967"/>
                 <a:ext cx="392906" cy="390300"/>
               </a:xfrm>
               <a:prstGeom prst="rect">
@@ -3161,6 +3172,7 @@
               </a:bodyPr>
               <a:lstStyle/>
               <a:p>
+                <a:pPr/>
                 <a14:m>
                   <m:oMathPara xmlns:m="http://schemas.openxmlformats.org/officeDocument/2006/math">
                     <m:oMathParaPr>
@@ -3223,7 +3235,7 @@
             </p:nvSpPr>
             <p:spPr>
               <a:xfrm>
-                <a:off x="5388769" y="1775857"/>
+                <a:off x="5365272" y="2184967"/>
                 <a:ext cx="392906" cy="390300"/>
               </a:xfrm>
               <a:prstGeom prst="rect">
@@ -3232,7 +3244,7 @@
               <a:blipFill>
                 <a:blip r:embed="rId3"/>
                 <a:stretch>
-                  <a:fillRect l="-6250" r="-34375" b="-6250"/>
+                  <a:fillRect l="-6154" r="-33846" b="-6250"/>
                 </a:stretch>
               </a:blipFill>
             </p:spPr>
@@ -3267,7 +3279,7 @@
             </p:nvSpPr>
             <p:spPr>
               <a:xfrm>
-                <a:off x="6377727" y="1381537"/>
+                <a:off x="6055748" y="1360221"/>
                 <a:ext cx="392906" cy="390300"/>
               </a:xfrm>
               <a:prstGeom prst="rect">
@@ -3281,6 +3293,7 @@
               </a:bodyPr>
               <a:lstStyle/>
               <a:p>
+                <a:pPr/>
                 <a14:m>
                   <m:oMathPara xmlns:m="http://schemas.openxmlformats.org/officeDocument/2006/math">
                     <m:oMathParaPr>
@@ -3324,7 +3337,7 @@
             </p:nvSpPr>
             <p:spPr>
               <a:xfrm>
-                <a:off x="6377727" y="1381537"/>
+                <a:off x="6055748" y="1360221"/>
                 <a:ext cx="392906" cy="390300"/>
               </a:xfrm>
               <a:prstGeom prst="rect">
@@ -3333,7 +3346,7 @@
               <a:blipFill>
                 <a:blip r:embed="rId4"/>
                 <a:stretch>
-                  <a:fillRect l="-6154" r="-38462" b="-4688"/>
+                  <a:fillRect l="-6154" r="-38462" b="-6250"/>
                 </a:stretch>
               </a:blipFill>
             </p:spPr>
@@ -3366,7 +3379,7 @@
         </p:nvSpPr>
         <p:spPr>
           <a:xfrm>
-            <a:off x="5923950" y="3132576"/>
+            <a:off x="5923950" y="3424264"/>
             <a:ext cx="392906" cy="369332"/>
           </a:xfrm>
           <a:prstGeom prst="rect">

</xml_diff>

<commit_message>
computed ne = 100 results
</commit_message>
<xml_diff>
--- a/results/figures/model.pptx
+++ b/results/figures/model.pptx
@@ -243,7 +243,7 @@
           <a:p>
             <a:fld id="{329862B0-1AD4-4AD5-9804-4753F3753061}" type="datetimeFigureOut">
               <a:rPr lang="en-US" smtClean="0"/>
-              <a:t>2/16/2024</a:t>
+              <a:t>3/25/2024</a:t>
             </a:fld>
             <a:endParaRPr lang="en-US"/>
           </a:p>
@@ -413,7 +413,7 @@
           <a:p>
             <a:fld id="{329862B0-1AD4-4AD5-9804-4753F3753061}" type="datetimeFigureOut">
               <a:rPr lang="en-US" smtClean="0"/>
-              <a:t>2/16/2024</a:t>
+              <a:t>3/25/2024</a:t>
             </a:fld>
             <a:endParaRPr lang="en-US"/>
           </a:p>
@@ -593,7 +593,7 @@
           <a:p>
             <a:fld id="{329862B0-1AD4-4AD5-9804-4753F3753061}" type="datetimeFigureOut">
               <a:rPr lang="en-US" smtClean="0"/>
-              <a:t>2/16/2024</a:t>
+              <a:t>3/25/2024</a:t>
             </a:fld>
             <a:endParaRPr lang="en-US"/>
           </a:p>
@@ -763,7 +763,7 @@
           <a:p>
             <a:fld id="{329862B0-1AD4-4AD5-9804-4753F3753061}" type="datetimeFigureOut">
               <a:rPr lang="en-US" smtClean="0"/>
-              <a:t>2/16/2024</a:t>
+              <a:t>3/25/2024</a:t>
             </a:fld>
             <a:endParaRPr lang="en-US"/>
           </a:p>
@@ -1009,7 +1009,7 @@
           <a:p>
             <a:fld id="{329862B0-1AD4-4AD5-9804-4753F3753061}" type="datetimeFigureOut">
               <a:rPr lang="en-US" smtClean="0"/>
-              <a:t>2/16/2024</a:t>
+              <a:t>3/25/2024</a:t>
             </a:fld>
             <a:endParaRPr lang="en-US"/>
           </a:p>
@@ -1241,7 +1241,7 @@
           <a:p>
             <a:fld id="{329862B0-1AD4-4AD5-9804-4753F3753061}" type="datetimeFigureOut">
               <a:rPr lang="en-US" smtClean="0"/>
-              <a:t>2/16/2024</a:t>
+              <a:t>3/25/2024</a:t>
             </a:fld>
             <a:endParaRPr lang="en-US"/>
           </a:p>
@@ -1608,7 +1608,7 @@
           <a:p>
             <a:fld id="{329862B0-1AD4-4AD5-9804-4753F3753061}" type="datetimeFigureOut">
               <a:rPr lang="en-US" smtClean="0"/>
-              <a:t>2/16/2024</a:t>
+              <a:t>3/25/2024</a:t>
             </a:fld>
             <a:endParaRPr lang="en-US"/>
           </a:p>
@@ -1726,7 +1726,7 @@
           <a:p>
             <a:fld id="{329862B0-1AD4-4AD5-9804-4753F3753061}" type="datetimeFigureOut">
               <a:rPr lang="en-US" smtClean="0"/>
-              <a:t>2/16/2024</a:t>
+              <a:t>3/25/2024</a:t>
             </a:fld>
             <a:endParaRPr lang="en-US"/>
           </a:p>
@@ -1821,7 +1821,7 @@
           <a:p>
             <a:fld id="{329862B0-1AD4-4AD5-9804-4753F3753061}" type="datetimeFigureOut">
               <a:rPr lang="en-US" smtClean="0"/>
-              <a:t>2/16/2024</a:t>
+              <a:t>3/25/2024</a:t>
             </a:fld>
             <a:endParaRPr lang="en-US"/>
           </a:p>
@@ -2098,7 +2098,7 @@
           <a:p>
             <a:fld id="{329862B0-1AD4-4AD5-9804-4753F3753061}" type="datetimeFigureOut">
               <a:rPr lang="en-US" smtClean="0"/>
-              <a:t>2/16/2024</a:t>
+              <a:t>3/25/2024</a:t>
             </a:fld>
             <a:endParaRPr lang="en-US"/>
           </a:p>
@@ -2355,7 +2355,7 @@
           <a:p>
             <a:fld id="{329862B0-1AD4-4AD5-9804-4753F3753061}" type="datetimeFigureOut">
               <a:rPr lang="en-US" smtClean="0"/>
-              <a:t>2/16/2024</a:t>
+              <a:t>3/25/2024</a:t>
             </a:fld>
             <a:endParaRPr lang="en-US"/>
           </a:p>
@@ -2568,7 +2568,7 @@
           <a:p>
             <a:fld id="{329862B0-1AD4-4AD5-9804-4753F3753061}" type="datetimeFigureOut">
               <a:rPr lang="en-US" smtClean="0"/>
-              <a:t>2/16/2024</a:t>
+              <a:t>3/25/2024</a:t>
             </a:fld>
             <a:endParaRPr lang="en-US"/>
           </a:p>
@@ -3029,7 +3029,7 @@
           <a:prstGeom prst="line">
             <a:avLst/>
           </a:prstGeom>
-          <a:ln w="76200">
+          <a:ln w="38100">
             <a:solidFill>
               <a:schemeClr val="tx1"/>
             </a:solidFill>
@@ -3069,12 +3069,12 @@
         <p:spPr>
           <a:xfrm>
             <a:off x="5032763" y="1750521"/>
-            <a:ext cx="2448692" cy="0"/>
+            <a:ext cx="2468880" cy="0"/>
           </a:xfrm>
           <a:prstGeom prst="line">
             <a:avLst/>
           </a:prstGeom>
-          <a:ln w="76200">
+          <a:ln w="38100">
             <a:solidFill>
               <a:schemeClr val="tx1"/>
             </a:solidFill>
@@ -3119,11 +3119,11 @@
           <a:prstGeom prst="line">
             <a:avLst/>
           </a:prstGeom>
-          <a:ln w="76200">
+          <a:ln w="38100">
             <a:solidFill>
               <a:schemeClr val="tx1"/>
             </a:solidFill>
-            <a:headEnd type="triangle"/>
+            <a:headEnd type="none"/>
             <a:tailEnd type="triangle"/>
           </a:ln>
         </p:spPr>
@@ -3142,8 +3142,8 @@
           </a:fontRef>
         </p:style>
       </p:cxnSp>
-      <mc:AlternateContent xmlns:mc="http://schemas.openxmlformats.org/markup-compatibility/2006">
-        <mc:Choice xmlns:a14="http://schemas.microsoft.com/office/drawing/2010/main" Requires="a14">
+      <mc:AlternateContent xmlns:mc="http://schemas.openxmlformats.org/markup-compatibility/2006" xmlns:a14="http://schemas.microsoft.com/office/drawing/2010/main">
+        <mc:Choice Requires="a14">
           <p:sp>
             <p:nvSpPr>
               <p:cNvPr id="12" name="TextBox 11">
@@ -3218,7 +3218,7 @@
             </p:txBody>
           </p:sp>
         </mc:Choice>
-        <mc:Fallback>
+        <mc:Fallback xmlns="">
           <p:sp>
             <p:nvSpPr>
               <p:cNvPr id="12" name="TextBox 11">
@@ -3263,8 +3263,8 @@
           </p:sp>
         </mc:Fallback>
       </mc:AlternateContent>
-      <mc:AlternateContent xmlns:mc="http://schemas.openxmlformats.org/markup-compatibility/2006">
-        <mc:Choice xmlns:a14="http://schemas.microsoft.com/office/drawing/2010/main" Requires="a14">
+      <mc:AlternateContent xmlns:mc="http://schemas.openxmlformats.org/markup-compatibility/2006" xmlns:a14="http://schemas.microsoft.com/office/drawing/2010/main">
+        <mc:Choice Requires="a14">
           <p:sp>
             <p:nvSpPr>
               <p:cNvPr id="13" name="TextBox 12">
@@ -3320,7 +3320,7 @@
             </p:txBody>
           </p:sp>
         </mc:Choice>
-        <mc:Fallback>
+        <mc:Fallback xmlns="">
           <p:sp>
             <p:nvSpPr>
               <p:cNvPr id="13" name="TextBox 12">

</xml_diff>